<commit_message>
very rough draft of chap2. Also added referenceable sections to appendix clustering and update in text referencing to it. ROOT citation in bib is off.
</commit_message>
<xml_diff>
--- a/extraMaterials/testbench_diagram.pptx
+++ b/extraMaterials/testbench_diagram.pptx
@@ -104,6 +104,22 @@
       </a:defRPr>
     </a:lvl9pPr>
   </p:defaultTextStyle>
+  <p:extLst>
+    <p:ext uri="{EFAFB233-063F-42B5-8137-9DF3F51BA10A}">
+      <p15:sldGuideLst xmlns:p15="http://schemas.microsoft.com/office/powerpoint/2012/main">
+        <p15:guide id="1" orient="horz" pos="2160" userDrawn="1">
+          <p15:clr>
+            <a:srgbClr val="A4A3A4"/>
+          </p15:clr>
+        </p15:guide>
+        <p15:guide id="2" pos="3840" userDrawn="1">
+          <p15:clr>
+            <a:srgbClr val="A4A3A4"/>
+          </p15:clr>
+        </p15:guide>
+      </p15:sldGuideLst>
+    </p:ext>
+  </p:extLst>
 </p:presentation>
 </file>
 
@@ -254,7 +270,7 @@
           <a:p>
             <a:fld id="{617BF6C4-96A0-45A6-9390-663A7BD0EF89}" type="datetimeFigureOut">
               <a:rPr lang="en-US" smtClean="0"/>
-              <a:t>8/27/2021</a:t>
+              <a:t>8/30/2021</a:t>
             </a:fld>
             <a:endParaRPr lang="en-US"/>
           </a:p>
@@ -452,7 +468,7 @@
           <a:p>
             <a:fld id="{617BF6C4-96A0-45A6-9390-663A7BD0EF89}" type="datetimeFigureOut">
               <a:rPr lang="en-US" smtClean="0"/>
-              <a:t>8/27/2021</a:t>
+              <a:t>8/30/2021</a:t>
             </a:fld>
             <a:endParaRPr lang="en-US"/>
           </a:p>
@@ -660,7 +676,7 @@
           <a:p>
             <a:fld id="{617BF6C4-96A0-45A6-9390-663A7BD0EF89}" type="datetimeFigureOut">
               <a:rPr lang="en-US" smtClean="0"/>
-              <a:t>8/27/2021</a:t>
+              <a:t>8/30/2021</a:t>
             </a:fld>
             <a:endParaRPr lang="en-US"/>
           </a:p>
@@ -858,7 +874,7 @@
           <a:p>
             <a:fld id="{617BF6C4-96A0-45A6-9390-663A7BD0EF89}" type="datetimeFigureOut">
               <a:rPr lang="en-US" smtClean="0"/>
-              <a:t>8/27/2021</a:t>
+              <a:t>8/30/2021</a:t>
             </a:fld>
             <a:endParaRPr lang="en-US"/>
           </a:p>
@@ -1133,7 +1149,7 @@
           <a:p>
             <a:fld id="{617BF6C4-96A0-45A6-9390-663A7BD0EF89}" type="datetimeFigureOut">
               <a:rPr lang="en-US" smtClean="0"/>
-              <a:t>8/27/2021</a:t>
+              <a:t>8/30/2021</a:t>
             </a:fld>
             <a:endParaRPr lang="en-US"/>
           </a:p>
@@ -1398,7 +1414,7 @@
           <a:p>
             <a:fld id="{617BF6C4-96A0-45A6-9390-663A7BD0EF89}" type="datetimeFigureOut">
               <a:rPr lang="en-US" smtClean="0"/>
-              <a:t>8/27/2021</a:t>
+              <a:t>8/30/2021</a:t>
             </a:fld>
             <a:endParaRPr lang="en-US"/>
           </a:p>
@@ -1810,7 +1826,7 @@
           <a:p>
             <a:fld id="{617BF6C4-96A0-45A6-9390-663A7BD0EF89}" type="datetimeFigureOut">
               <a:rPr lang="en-US" smtClean="0"/>
-              <a:t>8/27/2021</a:t>
+              <a:t>8/30/2021</a:t>
             </a:fld>
             <a:endParaRPr lang="en-US"/>
           </a:p>
@@ -1951,7 +1967,7 @@
           <a:p>
             <a:fld id="{617BF6C4-96A0-45A6-9390-663A7BD0EF89}" type="datetimeFigureOut">
               <a:rPr lang="en-US" smtClean="0"/>
-              <a:t>8/27/2021</a:t>
+              <a:t>8/30/2021</a:t>
             </a:fld>
             <a:endParaRPr lang="en-US"/>
           </a:p>
@@ -2064,7 +2080,7 @@
           <a:p>
             <a:fld id="{617BF6C4-96A0-45A6-9390-663A7BD0EF89}" type="datetimeFigureOut">
               <a:rPr lang="en-US" smtClean="0"/>
-              <a:t>8/27/2021</a:t>
+              <a:t>8/30/2021</a:t>
             </a:fld>
             <a:endParaRPr lang="en-US"/>
           </a:p>
@@ -2375,7 +2391,7 @@
           <a:p>
             <a:fld id="{617BF6C4-96A0-45A6-9390-663A7BD0EF89}" type="datetimeFigureOut">
               <a:rPr lang="en-US" smtClean="0"/>
-              <a:t>8/27/2021</a:t>
+              <a:t>8/30/2021</a:t>
             </a:fld>
             <a:endParaRPr lang="en-US"/>
           </a:p>
@@ -2663,7 +2679,7 @@
           <a:p>
             <a:fld id="{617BF6C4-96A0-45A6-9390-663A7BD0EF89}" type="datetimeFigureOut">
               <a:rPr lang="en-US" smtClean="0"/>
-              <a:t>8/27/2021</a:t>
+              <a:t>8/30/2021</a:t>
             </a:fld>
             <a:endParaRPr lang="en-US"/>
           </a:p>
@@ -2904,7 +2920,7 @@
           <a:p>
             <a:fld id="{617BF6C4-96A0-45A6-9390-663A7BD0EF89}" type="datetimeFigureOut">
               <a:rPr lang="en-US" smtClean="0"/>
-              <a:t>8/27/2021</a:t>
+              <a:t>8/30/2021</a:t>
             </a:fld>
             <a:endParaRPr lang="en-US"/>
           </a:p>
@@ -3323,10 +3339,10 @@
       </p:grpSpPr>
       <p:grpSp>
         <p:nvGrpSpPr>
-          <p:cNvPr id="28" name="Group 27">
-            <a:extLst>
-              <a:ext uri="{FF2B5EF4-FFF2-40B4-BE49-F238E27FC236}">
-                <a16:creationId xmlns:a16="http://schemas.microsoft.com/office/drawing/2014/main" id="{8D937B38-CF1F-47A2-A5D8-5C032F4EA743}"/>
+          <p:cNvPr id="10" name="Group 9">
+            <a:extLst>
+              <a:ext uri="{FF2B5EF4-FFF2-40B4-BE49-F238E27FC236}">
+                <a16:creationId xmlns:a16="http://schemas.microsoft.com/office/drawing/2014/main" id="{7AB5154E-3EFE-4D34-9841-C493D4462103}"/>
               </a:ext>
             </a:extLst>
           </p:cNvPr>
@@ -3474,8 +3490,8 @@
           </p:nvSpPr>
           <p:spPr>
             <a:xfrm>
-              <a:off x="2875554" y="2674834"/>
-              <a:ext cx="1298961" cy="646331"/>
+              <a:off x="1803968" y="2474747"/>
+              <a:ext cx="1785465" cy="646331"/>
             </a:xfrm>
             <a:prstGeom prst="rect">
               <a:avLst/>
@@ -3493,7 +3509,7 @@
               <a:pPr algn="ctr"/>
               <a:r>
                 <a:rPr lang="en-US" dirty="0"/>
-                <a:t>Scintillator PMT array</a:t>
+                <a:t>Scintillator-PMT array</a:t>
               </a:r>
             </a:p>
           </p:txBody>
@@ -3515,8 +3531,8 @@
           </p:nvCxnSpPr>
           <p:spPr>
             <a:xfrm flipV="1">
-              <a:off x="3525035" y="495656"/>
-              <a:ext cx="431668" cy="2179178"/>
+              <a:off x="2696701" y="435836"/>
+              <a:ext cx="1225819" cy="2038911"/>
             </a:xfrm>
             <a:prstGeom prst="straightConnector1">
               <a:avLst/>
@@ -3560,8 +3576,8 @@
           </p:nvCxnSpPr>
           <p:spPr>
             <a:xfrm>
-              <a:off x="3525035" y="3321165"/>
-              <a:ext cx="1135984" cy="1755037"/>
+              <a:off x="2696701" y="3121078"/>
+              <a:ext cx="1849662" cy="1929486"/>
             </a:xfrm>
             <a:prstGeom prst="straightConnector1">
               <a:avLst/>

</xml_diff>